<commit_message>
update to Day presentation, added angular-cli-lazyload sample app
</commit_message>
<xml_diff>
--- a/day4/A-Day4-Routing-UnitTesting.pptx
+++ b/day4/A-Day4-Routing-UnitTesting.pptx
@@ -169,7 +169,7 @@
   </p:defaultTextStyle>
   <p:extLst>
     <p:ext uri="{EFAFB233-063F-42B5-8137-9DF3F51BA10A}">
-      <p15:sldGuideLst xmlns:p15="http://schemas.microsoft.com/office/powerpoint/2012/main">
+      <p15:sldGuideLst xmlns:p15="http://schemas.microsoft.com/office/powerpoint/2012/main" xmlns="">
         <p15:guide id="1" orient="horz" pos="4233">
           <p15:clr>
             <a:srgbClr val="A4A3A4"/>
@@ -183,7 +183,7 @@
       </p15:sldGuideLst>
     </p:ext>
     <p:ext uri="{2D200454-40CA-4A62-9FC3-DE9A4176ACB9}">
-      <p15:notesGuideLst xmlns:p15="http://schemas.microsoft.com/office/powerpoint/2012/main">
+      <p15:notesGuideLst xmlns:p15="http://schemas.microsoft.com/office/powerpoint/2012/main" xmlns="">
         <p15:guide id="1" orient="horz" pos="3120">
           <p15:clr>
             <a:srgbClr val="A4A3A4"/>
@@ -9524,7 +9524,7 @@
           <a:graphicData uri="http://schemas.openxmlformats.org/presentationml/2006/ole">
             <mc:AlternateContent xmlns:mc="http://schemas.openxmlformats.org/markup-compatibility/2006">
               <mc:Choice xmlns:v="urn:schemas-microsoft-com:vml" Requires="v">
-                <p:oleObj spid="_x0000_s1146" name="think-cell Slide" r:id="rId25" imgW="0" imgH="0" progId="">
+                <p:oleObj spid="_x0000_s1150" name="think-cell Slide" r:id="rId25" imgW="0" imgH="0" progId="">
                   <p:embed/>
                 </p:oleObj>
               </mc:Choice>
@@ -10274,7 +10274,7 @@
           <a:graphicData uri="http://schemas.openxmlformats.org/presentationml/2006/ole">
             <mc:AlternateContent xmlns:mc="http://schemas.openxmlformats.org/markup-compatibility/2006">
               <mc:Choice xmlns:v="urn:schemas-microsoft-com:vml" Requires="v">
-                <p:oleObj spid="_x0000_s1147" name="Acrobat Document" r:id="rId27" imgW="12966480" imgH="8997120" progId="AcroExch.Document.11">
+                <p:oleObj spid="_x0000_s1151" name="Acrobat Document" r:id="rId27" imgW="12966480" imgH="8997120" progId="AcroExch.Document.11">
                   <p:embed/>
                 </p:oleObj>
               </mc:Choice>
@@ -13654,7 +13654,7 @@
           <a:graphicData uri="http://schemas.openxmlformats.org/presentationml/2006/ole">
             <mc:AlternateContent xmlns:mc="http://schemas.openxmlformats.org/markup-compatibility/2006">
               <mc:Choice xmlns:v="urn:schemas-microsoft-com:vml" Requires="v">
-                <p:oleObj spid="_x0000_s2112" name="think-cell Slide" r:id="rId5" imgW="0" imgH="0" progId="">
+                <p:oleObj spid="_x0000_s2114" name="think-cell Slide" r:id="rId5" imgW="0" imgH="0" progId="">
                   <p:embed/>
                 </p:oleObj>
               </mc:Choice>
@@ -14242,7 +14242,7 @@
           <a:graphicData uri="http://schemas.openxmlformats.org/presentationml/2006/ole">
             <mc:AlternateContent xmlns:mc="http://schemas.openxmlformats.org/markup-compatibility/2006">
               <mc:Choice xmlns:v="urn:schemas-microsoft-com:vml" Requires="v">
-                <p:oleObj spid="_x0000_s75781" name="think-cell Slide" r:id="rId5" imgW="0" imgH="0" progId="">
+                <p:oleObj spid="_x0000_s75783" name="think-cell Slide" r:id="rId5" imgW="0" imgH="0" progId="">
                   <p:embed/>
                 </p:oleObj>
               </mc:Choice>
@@ -14362,33 +14362,8 @@
                 <a:ea typeface="+mj-ea"/>
                 <a:cs typeface="+mj-cs"/>
               </a:rPr>
-              <a:t> </a:t>
-            </a:r>
-            <a:r>
-              <a:rPr lang="en-US" sz="2000" b="1" kern="0" dirty="0" smtClean="0">
-                <a:solidFill>
-                  <a:schemeClr val="tx2">
-                    <a:lumMod val="75000"/>
-                    <a:lumOff val="25000"/>
-                  </a:schemeClr>
-                </a:solidFill>
-                <a:latin typeface="Open Sans"/>
-                <a:ea typeface="+mj-ea"/>
-                <a:cs typeface="+mj-cs"/>
-              </a:rPr>
-              <a:t>Routing</a:t>
-            </a:r>
-            <a:endParaRPr lang="en-US" sz="2000" b="1" kern="0" dirty="0" smtClean="0">
-              <a:solidFill>
-                <a:schemeClr val="tx2">
-                  <a:lumMod val="75000"/>
-                  <a:lumOff val="25000"/>
-                </a:schemeClr>
-              </a:solidFill>
-              <a:latin typeface="Open Sans"/>
-              <a:ea typeface="+mj-ea"/>
-              <a:cs typeface="+mj-cs"/>
-            </a:endParaRPr>
+              <a:t> Routing</a:t>
+            </a:r>
           </a:p>
           <a:p>
             <a:pPr lvl="0" defTabSz="895350" eaLnBrk="0" hangingPunct="0">
@@ -14784,15 +14759,6 @@
               </a:rPr>
               <a:t> configured to use Guard Class</a:t>
             </a:r>
-            <a:endParaRPr lang="en-US" sz="1800" dirty="0" smtClean="0">
-              <a:solidFill>
-                <a:schemeClr val="tx2">
-                  <a:lumMod val="75000"/>
-                  <a:lumOff val="25000"/>
-                </a:schemeClr>
-              </a:solidFill>
-              <a:latin typeface="Open Sans"/>
-            </a:endParaRPr>
           </a:p>
         </p:txBody>
       </p:sp>
@@ -14900,14 +14866,6 @@
               </a:rPr>
               <a:t> to the route we want to guard.</a:t>
             </a:r>
-            <a:endParaRPr lang="en-US" sz="1600" dirty="0" smtClean="0">
-              <a:solidFill>
-                <a:srgbClr val="37515F"/>
-              </a:solidFill>
-              <a:latin typeface="Open Sans" pitchFamily="34" charset="0"/>
-              <a:ea typeface="Open Sans" pitchFamily="34" charset="0"/>
-              <a:cs typeface="Open Sans" pitchFamily="34" charset="0"/>
-            </a:endParaRPr>
           </a:p>
         </p:txBody>
       </p:sp>
@@ -14942,16 +14900,7 @@
                 </a:solidFill>
                 <a:latin typeface="Source Code Pro"/>
               </a:rPr>
-              <a:t>// </a:t>
-            </a:r>
-            <a:r>
-              <a:rPr lang="en-US" sz="1400" dirty="0" smtClean="0">
-                <a:solidFill>
-                  <a:srgbClr val="1AB076"/>
-                </a:solidFill>
-                <a:latin typeface="Source Code Pro"/>
-              </a:rPr>
-              <a:t>Configuration route with parameter</a:t>
+              <a:t>// Configuration route with parameter</a:t>
             </a:r>
             <a:endParaRPr lang="en-US" sz="1400" dirty="0">
               <a:solidFill>
@@ -14985,11 +14934,6 @@
               </a:rPr>
               <a:t>routes: Routes = [ </a:t>
             </a:r>
-            <a:endParaRPr lang="en-US" sz="1600" dirty="0">
-              <a:solidFill>
-                <a:schemeClr val="bg1"/>
-              </a:solidFill>
-            </a:endParaRPr>
           </a:p>
           <a:p>
             <a:r>
@@ -15087,11 +15031,6 @@
               </a:rPr>
               <a:t>}</a:t>
             </a:r>
-            <a:endParaRPr lang="en-US" sz="1600" dirty="0" smtClean="0">
-              <a:solidFill>
-                <a:schemeClr val="bg1"/>
-              </a:solidFill>
-            </a:endParaRPr>
           </a:p>
           <a:p>
             <a:r>
@@ -15102,11 +15041,6 @@
               </a:rPr>
               <a:t>];</a:t>
             </a:r>
-            <a:endParaRPr lang="en-US" sz="1600" dirty="0" smtClean="0">
-              <a:solidFill>
-                <a:schemeClr val="bg1"/>
-              </a:solidFill>
-            </a:endParaRPr>
           </a:p>
         </p:txBody>
       </p:sp>
@@ -15172,14 +15106,6 @@
               </a:rPr>
               <a:t> the routing will activate, otherwise it will not.</a:t>
             </a:r>
-            <a:endParaRPr lang="en-US" sz="1600" dirty="0" smtClean="0">
-              <a:solidFill>
-                <a:srgbClr val="37515F"/>
-              </a:solidFill>
-              <a:latin typeface="Open Sans" pitchFamily="34" charset="0"/>
-              <a:ea typeface="Open Sans" pitchFamily="34" charset="0"/>
-              <a:cs typeface="Open Sans" pitchFamily="34" charset="0"/>
-            </a:endParaRPr>
           </a:p>
         </p:txBody>
       </p:sp>
@@ -15240,7 +15166,7 @@
           <a:graphicData uri="http://schemas.openxmlformats.org/presentationml/2006/ole">
             <mc:AlternateContent xmlns:mc="http://schemas.openxmlformats.org/markup-compatibility/2006">
               <mc:Choice xmlns:v="urn:schemas-microsoft-com:vml" Requires="v">
-                <p:oleObj spid="_x0000_s76806" name="think-cell Slide" r:id="rId5" imgW="0" imgH="0" progId="">
+                <p:oleObj spid="_x0000_s76808" name="think-cell Slide" r:id="rId5" imgW="0" imgH="0" progId="">
                   <p:embed/>
                 </p:oleObj>
               </mc:Choice>
@@ -15360,33 +15286,8 @@
                 <a:ea typeface="+mj-ea"/>
                 <a:cs typeface="+mj-cs"/>
               </a:rPr>
-              <a:t> </a:t>
-            </a:r>
-            <a:r>
-              <a:rPr lang="en-US" sz="2000" b="1" kern="0" dirty="0" smtClean="0">
-                <a:solidFill>
-                  <a:schemeClr val="tx2">
-                    <a:lumMod val="75000"/>
-                    <a:lumOff val="25000"/>
-                  </a:schemeClr>
-                </a:solidFill>
-                <a:latin typeface="Open Sans"/>
-                <a:ea typeface="+mj-ea"/>
-                <a:cs typeface="+mj-cs"/>
-              </a:rPr>
-              <a:t>Routing</a:t>
-            </a:r>
-            <a:endParaRPr lang="en-US" sz="2000" b="1" kern="0" dirty="0" smtClean="0">
-              <a:solidFill>
-                <a:schemeClr val="tx2">
-                  <a:lumMod val="75000"/>
-                  <a:lumOff val="25000"/>
-                </a:schemeClr>
-              </a:solidFill>
-              <a:latin typeface="Open Sans"/>
-              <a:ea typeface="+mj-ea"/>
-              <a:cs typeface="+mj-cs"/>
-            </a:endParaRPr>
+              <a:t> Routing</a:t>
+            </a:r>
           </a:p>
           <a:p>
             <a:pPr lvl="0" defTabSz="895350" eaLnBrk="0" hangingPunct="0">
@@ -15782,15 +15683,6 @@
               </a:rPr>
               <a:t> routes per sub-system/module</a:t>
             </a:r>
-            <a:endParaRPr lang="en-US" sz="1800" dirty="0" smtClean="0">
-              <a:solidFill>
-                <a:schemeClr val="tx2">
-                  <a:lumMod val="75000"/>
-                  <a:lumOff val="25000"/>
-                </a:schemeClr>
-              </a:solidFill>
-              <a:latin typeface="Open Sans"/>
-            </a:endParaRPr>
           </a:p>
         </p:txBody>
       </p:sp>
@@ -15871,15 +15763,6 @@
               </a:rPr>
               <a:t>“Parent”/App Routes:</a:t>
             </a:r>
-            <a:endParaRPr lang="en-US" sz="1800" dirty="0" smtClean="0">
-              <a:solidFill>
-                <a:schemeClr val="tx2">
-                  <a:lumMod val="75000"/>
-                  <a:lumOff val="25000"/>
-                </a:schemeClr>
-              </a:solidFill>
-              <a:latin typeface="Open Sans"/>
-            </a:endParaRPr>
           </a:p>
         </p:txBody>
       </p:sp>
@@ -15922,15 +15805,6 @@
               </a:rPr>
               <a:t>Module/Child Routes:</a:t>
             </a:r>
-            <a:endParaRPr lang="en-US" sz="1800" dirty="0" smtClean="0">
-              <a:solidFill>
-                <a:schemeClr val="tx2">
-                  <a:lumMod val="75000"/>
-                  <a:lumOff val="25000"/>
-                </a:schemeClr>
-              </a:solidFill>
-              <a:latin typeface="Open Sans"/>
-            </a:endParaRPr>
           </a:p>
         </p:txBody>
       </p:sp>
@@ -16092,16 +15966,7 @@
                 </a:solidFill>
                 <a:latin typeface="Source Code Pro"/>
               </a:rPr>
-              <a:t>feature</a:t>
-            </a:r>
-            <a:r>
-              <a:rPr lang="en-US" sz="1400" dirty="0" err="1" smtClean="0">
-                <a:solidFill>
-                  <a:srgbClr val="1AB076"/>
-                </a:solidFill>
-                <a:latin typeface="Source Code Pro"/>
-              </a:rPr>
-              <a:t>.module.ts</a:t>
+              <a:t>feature.module.ts</a:t>
             </a:r>
             <a:endParaRPr lang="en-US" sz="1400" b="1" dirty="0" smtClean="0"/>
           </a:p>
@@ -16685,11 +16550,6 @@
               </a:rPr>
               <a:t>} </a:t>
             </a:r>
-            <a:endParaRPr lang="en-US" sz="1400" dirty="0">
-              <a:solidFill>
-                <a:schemeClr val="bg1"/>
-              </a:solidFill>
-            </a:endParaRPr>
           </a:p>
           <a:p>
             <a:r>
@@ -16765,7 +16625,7 @@
           <a:graphicData uri="http://schemas.openxmlformats.org/presentationml/2006/ole">
             <mc:AlternateContent xmlns:mc="http://schemas.openxmlformats.org/markup-compatibility/2006">
               <mc:Choice xmlns:v="urn:schemas-microsoft-com:vml" Requires="v">
-                <p:oleObj spid="_x0000_s80898" name="think-cell Slide" r:id="rId5" imgW="0" imgH="0" progId="">
+                <p:oleObj spid="_x0000_s80900" name="think-cell Slide" r:id="rId5" imgW="0" imgH="0" progId="">
                   <p:embed/>
                 </p:oleObj>
               </mc:Choice>
@@ -16885,33 +16745,8 @@
                 <a:ea typeface="+mj-ea"/>
                 <a:cs typeface="+mj-cs"/>
               </a:rPr>
-              <a:t> </a:t>
-            </a:r>
-            <a:r>
-              <a:rPr lang="en-US" sz="2000" b="1" kern="0" dirty="0" smtClean="0">
-                <a:solidFill>
-                  <a:schemeClr val="tx2">
-                    <a:lumMod val="75000"/>
-                    <a:lumOff val="25000"/>
-                  </a:schemeClr>
-                </a:solidFill>
-                <a:latin typeface="Open Sans"/>
-                <a:ea typeface="+mj-ea"/>
-                <a:cs typeface="+mj-cs"/>
-              </a:rPr>
-              <a:t>Routing</a:t>
-            </a:r>
-            <a:endParaRPr lang="en-US" sz="2000" b="1" kern="0" dirty="0" smtClean="0">
-              <a:solidFill>
-                <a:schemeClr val="tx2">
-                  <a:lumMod val="75000"/>
-                  <a:lumOff val="25000"/>
-                </a:schemeClr>
-              </a:solidFill>
-              <a:latin typeface="Open Sans"/>
-              <a:ea typeface="+mj-ea"/>
-              <a:cs typeface="+mj-cs"/>
-            </a:endParaRPr>
+              <a:t> Routing</a:t>
+            </a:r>
           </a:p>
           <a:p>
             <a:pPr lvl="0" defTabSz="895350" eaLnBrk="0" hangingPunct="0">
@@ -17307,15 +17142,6 @@
               </a:rPr>
               <a:t> organize your routes</a:t>
             </a:r>
-            <a:endParaRPr lang="en-US" sz="1800" dirty="0" smtClean="0">
-              <a:solidFill>
-                <a:schemeClr val="tx2">
-                  <a:lumMod val="75000"/>
-                  <a:lumOff val="25000"/>
-                </a:schemeClr>
-              </a:solidFill>
-              <a:latin typeface="Open Sans"/>
-            </a:endParaRPr>
           </a:p>
         </p:txBody>
       </p:sp>
@@ -18334,7 +18160,7 @@
           <a:graphicData uri="http://schemas.openxmlformats.org/presentationml/2006/ole">
             <mc:AlternateContent xmlns:mc="http://schemas.openxmlformats.org/markup-compatibility/2006">
               <mc:Choice xmlns:v="urn:schemas-microsoft-com:vml" Requires="v">
-                <p:oleObj spid="_x0000_s81923" name="think-cell Slide" r:id="rId5" imgW="0" imgH="0" progId="">
+                <p:oleObj spid="_x0000_s81925" name="think-cell Slide" r:id="rId5" imgW="0" imgH="0" progId="">
                   <p:embed/>
                 </p:oleObj>
               </mc:Choice>
@@ -18454,33 +18280,8 @@
                 <a:ea typeface="+mj-ea"/>
                 <a:cs typeface="+mj-cs"/>
               </a:rPr>
-              <a:t> </a:t>
-            </a:r>
-            <a:r>
-              <a:rPr lang="en-US" sz="2000" b="1" kern="0" dirty="0" smtClean="0">
-                <a:solidFill>
-                  <a:schemeClr val="tx2">
-                    <a:lumMod val="75000"/>
-                    <a:lumOff val="25000"/>
-                  </a:schemeClr>
-                </a:solidFill>
-                <a:latin typeface="Open Sans"/>
-                <a:ea typeface="+mj-ea"/>
-                <a:cs typeface="+mj-cs"/>
-              </a:rPr>
-              <a:t>Routing</a:t>
-            </a:r>
-            <a:endParaRPr lang="en-US" sz="2000" b="1" kern="0" dirty="0" smtClean="0">
-              <a:solidFill>
-                <a:schemeClr val="tx2">
-                  <a:lumMod val="75000"/>
-                  <a:lumOff val="25000"/>
-                </a:schemeClr>
-              </a:solidFill>
-              <a:latin typeface="Open Sans"/>
-              <a:ea typeface="+mj-ea"/>
-              <a:cs typeface="+mj-cs"/>
-            </a:endParaRPr>
+              <a:t> Routing</a:t>
+            </a:r>
           </a:p>
           <a:p>
             <a:pPr lvl="0" defTabSz="895350" eaLnBrk="0" hangingPunct="0">
@@ -18876,15 +18677,6 @@
               </a:rPr>
               <a:t> import and use</a:t>
             </a:r>
-            <a:endParaRPr lang="en-US" sz="1800" dirty="0" smtClean="0">
-              <a:solidFill>
-                <a:schemeClr val="tx2">
-                  <a:lumMod val="75000"/>
-                  <a:lumOff val="25000"/>
-                </a:schemeClr>
-              </a:solidFill>
-              <a:latin typeface="Open Sans"/>
-            </a:endParaRPr>
           </a:p>
         </p:txBody>
       </p:sp>
@@ -19411,7 +19203,7 @@
           <a:graphicData uri="http://schemas.openxmlformats.org/presentationml/2006/ole">
             <mc:AlternateContent xmlns:mc="http://schemas.openxmlformats.org/markup-compatibility/2006">
               <mc:Choice xmlns:v="urn:schemas-microsoft-com:vml" Requires="v">
-                <p:oleObj spid="_x0000_s77830" name="think-cell Slide" r:id="rId5" imgW="0" imgH="0" progId="">
+                <p:oleObj spid="_x0000_s77832" name="think-cell Slide" r:id="rId5" imgW="0" imgH="0" progId="">
                   <p:embed/>
                 </p:oleObj>
               </mc:Choice>
@@ -19531,33 +19323,8 @@
                 <a:ea typeface="+mj-ea"/>
                 <a:cs typeface="+mj-cs"/>
               </a:rPr>
-              <a:t> </a:t>
-            </a:r>
-            <a:r>
-              <a:rPr lang="en-US" sz="2000" b="1" kern="0" dirty="0" smtClean="0">
-                <a:solidFill>
-                  <a:schemeClr val="tx2">
-                    <a:lumMod val="75000"/>
-                    <a:lumOff val="25000"/>
-                  </a:schemeClr>
-                </a:solidFill>
-                <a:latin typeface="Open Sans"/>
-                <a:ea typeface="+mj-ea"/>
-                <a:cs typeface="+mj-cs"/>
-              </a:rPr>
-              <a:t>Unit Testing</a:t>
-            </a:r>
-            <a:endParaRPr lang="en-US" sz="2000" b="1" kern="0" dirty="0" smtClean="0">
-              <a:solidFill>
-                <a:schemeClr val="tx2">
-                  <a:lumMod val="75000"/>
-                  <a:lumOff val="25000"/>
-                </a:schemeClr>
-              </a:solidFill>
-              <a:latin typeface="Open Sans"/>
-              <a:ea typeface="+mj-ea"/>
-              <a:cs typeface="+mj-cs"/>
-            </a:endParaRPr>
+              <a:t> Unit Testing</a:t>
+            </a:r>
           </a:p>
           <a:p>
             <a:pPr lvl="0" defTabSz="895350" eaLnBrk="0" hangingPunct="0">
@@ -20528,7 +20295,7 @@
           <a:graphicData uri="http://schemas.openxmlformats.org/presentationml/2006/ole">
             <mc:AlternateContent xmlns:mc="http://schemas.openxmlformats.org/markup-compatibility/2006">
               <mc:Choice xmlns:v="urn:schemas-microsoft-com:vml" Requires="v">
-                <p:oleObj spid="_x0000_s79875" name="think-cell Slide" r:id="rId5" imgW="0" imgH="0" progId="">
+                <p:oleObj spid="_x0000_s79877" name="think-cell Slide" r:id="rId5" imgW="0" imgH="0" progId="">
                   <p:embed/>
                 </p:oleObj>
               </mc:Choice>
@@ -20648,33 +20415,8 @@
                 <a:ea typeface="+mj-ea"/>
                 <a:cs typeface="+mj-cs"/>
               </a:rPr>
-              <a:t> </a:t>
-            </a:r>
-            <a:r>
-              <a:rPr lang="en-US" sz="2000" b="1" kern="0" dirty="0" smtClean="0">
-                <a:solidFill>
-                  <a:schemeClr val="tx2">
-                    <a:lumMod val="75000"/>
-                    <a:lumOff val="25000"/>
-                  </a:schemeClr>
-                </a:solidFill>
-                <a:latin typeface="Open Sans"/>
-                <a:ea typeface="+mj-ea"/>
-                <a:cs typeface="+mj-cs"/>
-              </a:rPr>
-              <a:t>Unit Testing</a:t>
-            </a:r>
-            <a:endParaRPr lang="en-US" sz="2000" b="1" kern="0" dirty="0" smtClean="0">
-              <a:solidFill>
-                <a:schemeClr val="tx2">
-                  <a:lumMod val="75000"/>
-                  <a:lumOff val="25000"/>
-                </a:schemeClr>
-              </a:solidFill>
-              <a:latin typeface="Open Sans"/>
-              <a:ea typeface="+mj-ea"/>
-              <a:cs typeface="+mj-cs"/>
-            </a:endParaRPr>
+              <a:t> Unit Testing</a:t>
+            </a:r>
           </a:p>
           <a:p>
             <a:pPr lvl="0" defTabSz="895350" eaLnBrk="0" hangingPunct="0">
@@ -21246,16 +20988,7 @@
                 </a:solidFill>
                 <a:latin typeface="Source Code Pro"/>
               </a:rPr>
-              <a:t>// </a:t>
-            </a:r>
-            <a:r>
-              <a:rPr lang="en-US" sz="1400" dirty="0" smtClean="0">
-                <a:solidFill>
-                  <a:srgbClr val="1AB076"/>
-                </a:solidFill>
-                <a:latin typeface="Source Code Pro"/>
-              </a:rPr>
-              <a:t>angular-</a:t>
+              <a:t>// angular-</a:t>
             </a:r>
             <a:r>
               <a:rPr lang="en-US" sz="1400" dirty="0" err="1" smtClean="0">
@@ -21690,7 +21423,7 @@
           <a:graphicData uri="http://schemas.openxmlformats.org/presentationml/2006/ole">
             <mc:AlternateContent xmlns:mc="http://schemas.openxmlformats.org/markup-compatibility/2006">
               <mc:Choice xmlns:v="urn:schemas-microsoft-com:vml" Requires="v">
-                <p:oleObj spid="_x0000_s82947" name="think-cell Slide" r:id="rId5" imgW="0" imgH="0" progId="">
+                <p:oleObj spid="_x0000_s82949" name="think-cell Slide" r:id="rId5" imgW="0" imgH="0" progId="">
                   <p:embed/>
                 </p:oleObj>
               </mc:Choice>
@@ -21810,33 +21543,8 @@
                 <a:ea typeface="+mj-ea"/>
                 <a:cs typeface="+mj-cs"/>
               </a:rPr>
-              <a:t> </a:t>
-            </a:r>
-            <a:r>
-              <a:rPr lang="en-US" sz="2000" b="1" kern="0" dirty="0" smtClean="0">
-                <a:solidFill>
-                  <a:schemeClr val="tx2">
-                    <a:lumMod val="75000"/>
-                    <a:lumOff val="25000"/>
-                  </a:schemeClr>
-                </a:solidFill>
-                <a:latin typeface="Open Sans"/>
-                <a:ea typeface="+mj-ea"/>
-                <a:cs typeface="+mj-cs"/>
-              </a:rPr>
-              <a:t>Unit Testing</a:t>
-            </a:r>
-            <a:endParaRPr lang="en-US" sz="2000" b="1" kern="0" dirty="0" smtClean="0">
-              <a:solidFill>
-                <a:schemeClr val="tx2">
-                  <a:lumMod val="75000"/>
-                  <a:lumOff val="25000"/>
-                </a:schemeClr>
-              </a:solidFill>
-              <a:latin typeface="Open Sans"/>
-              <a:ea typeface="+mj-ea"/>
-              <a:cs typeface="+mj-cs"/>
-            </a:endParaRPr>
+              <a:t> Unit Testing</a:t>
+            </a:r>
           </a:p>
           <a:p>
             <a:pPr lvl="0" defTabSz="895350" eaLnBrk="0" hangingPunct="0">
@@ -22953,7 +22661,7 @@
           <a:graphicData uri="http://schemas.openxmlformats.org/presentationml/2006/ole">
             <mc:AlternateContent xmlns:mc="http://schemas.openxmlformats.org/markup-compatibility/2006">
               <mc:Choice xmlns:v="urn:schemas-microsoft-com:vml" Requires="v">
-                <p:oleObj spid="_x0000_s83972" name="think-cell Slide" r:id="rId5" imgW="0" imgH="0" progId="">
+                <p:oleObj spid="_x0000_s83974" name="think-cell Slide" r:id="rId5" imgW="0" imgH="0" progId="">
                   <p:embed/>
                 </p:oleObj>
               </mc:Choice>
@@ -23073,33 +22781,8 @@
                 <a:ea typeface="+mj-ea"/>
                 <a:cs typeface="+mj-cs"/>
               </a:rPr>
-              <a:t> </a:t>
-            </a:r>
-            <a:r>
-              <a:rPr lang="en-US" sz="2000" b="1" kern="0" dirty="0" smtClean="0">
-                <a:solidFill>
-                  <a:schemeClr val="tx2">
-                    <a:lumMod val="75000"/>
-                    <a:lumOff val="25000"/>
-                  </a:schemeClr>
-                </a:solidFill>
-                <a:latin typeface="Open Sans"/>
-                <a:ea typeface="+mj-ea"/>
-                <a:cs typeface="+mj-cs"/>
-              </a:rPr>
-              <a:t>Unit Testing</a:t>
-            </a:r>
-            <a:endParaRPr lang="en-US" sz="2000" b="1" kern="0" dirty="0" smtClean="0">
-              <a:solidFill>
-                <a:schemeClr val="tx2">
-                  <a:lumMod val="75000"/>
-                  <a:lumOff val="25000"/>
-                </a:schemeClr>
-              </a:solidFill>
-              <a:latin typeface="Open Sans"/>
-              <a:ea typeface="+mj-ea"/>
-              <a:cs typeface="+mj-cs"/>
-            </a:endParaRPr>
+              <a:t> Unit Testing</a:t>
+            </a:r>
           </a:p>
           <a:p>
             <a:pPr lvl="0" defTabSz="895350" eaLnBrk="0" hangingPunct="0">
@@ -24655,7 +24338,7 @@
           <a:graphicData uri="http://schemas.openxmlformats.org/presentationml/2006/ole">
             <mc:AlternateContent xmlns:mc="http://schemas.openxmlformats.org/markup-compatibility/2006">
               <mc:Choice xmlns:v="urn:schemas-microsoft-com:vml" Requires="v">
-                <p:oleObj spid="_x0000_s84997" name="think-cell Slide" r:id="rId5" imgW="0" imgH="0" progId="">
+                <p:oleObj spid="_x0000_s84999" name="think-cell Slide" r:id="rId5" imgW="0" imgH="0" progId="">
                   <p:embed/>
                 </p:oleObj>
               </mc:Choice>
@@ -24775,33 +24458,8 @@
                 <a:ea typeface="+mj-ea"/>
                 <a:cs typeface="+mj-cs"/>
               </a:rPr>
-              <a:t> </a:t>
-            </a:r>
-            <a:r>
-              <a:rPr lang="en-US" sz="2000" b="1" kern="0" dirty="0" smtClean="0">
-                <a:solidFill>
-                  <a:schemeClr val="tx2">
-                    <a:lumMod val="75000"/>
-                    <a:lumOff val="25000"/>
-                  </a:schemeClr>
-                </a:solidFill>
-                <a:latin typeface="Open Sans"/>
-                <a:ea typeface="+mj-ea"/>
-                <a:cs typeface="+mj-cs"/>
-              </a:rPr>
-              <a:t>Unit Testing</a:t>
-            </a:r>
-            <a:endParaRPr lang="en-US" sz="2000" b="1" kern="0" dirty="0" smtClean="0">
-              <a:solidFill>
-                <a:schemeClr val="tx2">
-                  <a:lumMod val="75000"/>
-                  <a:lumOff val="25000"/>
-                </a:schemeClr>
-              </a:solidFill>
-              <a:latin typeface="Open Sans"/>
-              <a:ea typeface="+mj-ea"/>
-              <a:cs typeface="+mj-cs"/>
-            </a:endParaRPr>
+              <a:t> Unit Testing</a:t>
+            </a:r>
           </a:p>
           <a:p>
             <a:pPr lvl="0" defTabSz="895350" eaLnBrk="0" hangingPunct="0">
@@ -25143,7 +24801,7 @@
         <p:spPr>
           <a:xfrm>
             <a:off x="158750" y="446849"/>
-            <a:ext cx="3887733" cy="507831"/>
+            <a:ext cx="3887733" cy="456535"/>
           </a:xfrm>
           <a:prstGeom prst="rect">
             <a:avLst/>
@@ -25171,7 +24829,19 @@
                 </a:solidFill>
                 <a:latin typeface="Open Sans"/>
               </a:rPr>
-              <a:t>Test: Isolate your Subject Under Test</a:t>
+              <a:t>Test: Isolate your Subject </a:t>
+            </a:r>
+            <a:r>
+              <a:rPr lang="en-US" sz="1800" b="1" dirty="0" smtClean="0">
+                <a:solidFill>
+                  <a:schemeClr val="tx2">
+                    <a:lumMod val="75000"/>
+                    <a:lumOff val="25000"/>
+                  </a:schemeClr>
+                </a:solidFill>
+                <a:latin typeface="Open Sans"/>
+              </a:rPr>
+              <a:t>Under</a:t>
             </a:r>
             <a:endParaRPr lang="en-US" sz="1800" dirty="0" smtClean="0">
               <a:solidFill>
@@ -25193,7 +24863,7 @@
         </p:nvSpPr>
         <p:spPr>
           <a:xfrm>
-            <a:off x="64284" y="992830"/>
+            <a:off x="64284" y="1297640"/>
             <a:ext cx="3982199" cy="4031873"/>
           </a:xfrm>
           <a:prstGeom prst="rect">
@@ -25516,11 +25186,6 @@
               </a:rPr>
               <a:t>} }; </a:t>
             </a:r>
-            <a:endParaRPr lang="en-US" sz="1400" dirty="0">
-              <a:solidFill>
-                <a:schemeClr val="bg1"/>
-              </a:solidFill>
-            </a:endParaRPr>
           </a:p>
           <a:p>
             <a:endParaRPr lang="en-US" sz="1400" dirty="0" smtClean="0">
@@ -25820,7 +25485,7 @@
           <a:graphicData uri="http://schemas.openxmlformats.org/presentationml/2006/ole">
             <mc:AlternateContent xmlns:mc="http://schemas.openxmlformats.org/markup-compatibility/2006">
               <mc:Choice xmlns:v="urn:schemas-microsoft-com:vml" Requires="v">
-                <p:oleObj spid="_x0000_s86020" name="think-cell Slide" r:id="rId5" imgW="0" imgH="0" progId="">
+                <p:oleObj spid="_x0000_s86022" name="think-cell Slide" r:id="rId5" imgW="0" imgH="0" progId="">
                   <p:embed/>
                 </p:oleObj>
               </mc:Choice>
@@ -25940,33 +25605,8 @@
                 <a:ea typeface="+mj-ea"/>
                 <a:cs typeface="+mj-cs"/>
               </a:rPr>
-              <a:t> </a:t>
-            </a:r>
-            <a:r>
-              <a:rPr lang="en-US" sz="2000" b="1" kern="0" dirty="0" smtClean="0">
-                <a:solidFill>
-                  <a:schemeClr val="tx2">
-                    <a:lumMod val="75000"/>
-                    <a:lumOff val="25000"/>
-                  </a:schemeClr>
-                </a:solidFill>
-                <a:latin typeface="Open Sans"/>
-                <a:ea typeface="+mj-ea"/>
-                <a:cs typeface="+mj-cs"/>
-              </a:rPr>
-              <a:t>Unit Testing</a:t>
-            </a:r>
-            <a:endParaRPr lang="en-US" sz="2000" b="1" kern="0" dirty="0" smtClean="0">
-              <a:solidFill>
-                <a:schemeClr val="tx2">
-                  <a:lumMod val="75000"/>
-                  <a:lumOff val="25000"/>
-                </a:schemeClr>
-              </a:solidFill>
-              <a:latin typeface="Open Sans"/>
-              <a:ea typeface="+mj-ea"/>
-              <a:cs typeface="+mj-cs"/>
-            </a:endParaRPr>
+              <a:t> Unit Testing</a:t>
+            </a:r>
           </a:p>
           <a:p>
             <a:pPr lvl="0" defTabSz="895350" eaLnBrk="0" hangingPunct="0">
@@ -26578,7 +26218,7 @@
           <a:graphicData uri="http://schemas.openxmlformats.org/presentationml/2006/ole">
             <mc:AlternateContent xmlns:mc="http://schemas.openxmlformats.org/markup-compatibility/2006">
               <mc:Choice xmlns:v="urn:schemas-microsoft-com:vml" Requires="v">
-                <p:oleObj spid="_x0000_s8257" name="think-cell Slide" r:id="rId5" imgW="0" imgH="0" progId="">
+                <p:oleObj spid="_x0000_s8259" name="think-cell Slide" r:id="rId5" imgW="0" imgH="0" progId="">
                   <p:embed/>
                 </p:oleObj>
               </mc:Choice>
@@ -26721,21 +26361,7 @@
                 <a:ea typeface="+mj-ea"/>
                 <a:cs typeface="+mj-cs"/>
               </a:rPr>
-              <a:t>Routing, Unit </a:t>
-            </a:r>
-            <a:r>
-              <a:rPr lang="en-US" sz="2400" b="1" kern="0" dirty="0" smtClean="0">
-                <a:solidFill>
-                  <a:schemeClr val="tx2">
-                    <a:lumMod val="75000"/>
-                    <a:lumOff val="25000"/>
-                  </a:schemeClr>
-                </a:solidFill>
-                <a:latin typeface="Open Sans"/>
-                <a:ea typeface="+mj-ea"/>
-                <a:cs typeface="+mj-cs"/>
-              </a:rPr>
-              <a:t>Testing</a:t>
+              <a:t>Routing, Unit Testing</a:t>
             </a:r>
             <a:endParaRPr lang="en-US" sz="2400" b="1" kern="0" dirty="0">
               <a:solidFill>
@@ -27121,7 +26747,7 @@
           <a:graphicData uri="http://schemas.openxmlformats.org/presentationml/2006/ole">
             <mc:AlternateContent xmlns:mc="http://schemas.openxmlformats.org/markup-compatibility/2006">
               <mc:Choice xmlns:v="urn:schemas-microsoft-com:vml" Requires="v">
-                <p:oleObj spid="_x0000_s87042" name="think-cell Slide" r:id="rId5" imgW="0" imgH="0" progId="">
+                <p:oleObj spid="_x0000_s87044" name="think-cell Slide" r:id="rId5" imgW="0" imgH="0" progId="">
                   <p:embed/>
                 </p:oleObj>
               </mc:Choice>
@@ -27241,33 +26867,8 @@
                 <a:ea typeface="+mj-ea"/>
                 <a:cs typeface="+mj-cs"/>
               </a:rPr>
-              <a:t> </a:t>
-            </a:r>
-            <a:r>
-              <a:rPr lang="en-US" sz="2000" b="1" kern="0" dirty="0" smtClean="0">
-                <a:solidFill>
-                  <a:schemeClr val="tx2">
-                    <a:lumMod val="75000"/>
-                    <a:lumOff val="25000"/>
-                  </a:schemeClr>
-                </a:solidFill>
-                <a:latin typeface="Open Sans"/>
-                <a:ea typeface="+mj-ea"/>
-                <a:cs typeface="+mj-cs"/>
-              </a:rPr>
-              <a:t>Unit Testing</a:t>
-            </a:r>
-            <a:endParaRPr lang="en-US" sz="2000" b="1" kern="0" dirty="0" smtClean="0">
-              <a:solidFill>
-                <a:schemeClr val="tx2">
-                  <a:lumMod val="75000"/>
-                  <a:lumOff val="25000"/>
-                </a:schemeClr>
-              </a:solidFill>
-              <a:latin typeface="Open Sans"/>
-              <a:ea typeface="+mj-ea"/>
-              <a:cs typeface="+mj-cs"/>
-            </a:endParaRPr>
+              <a:t> Unit Testing</a:t>
+            </a:r>
           </a:p>
           <a:p>
             <a:pPr lvl="0" defTabSz="895350" eaLnBrk="0" hangingPunct="0">
@@ -27835,7 +27436,7 @@
           <a:graphicData uri="http://schemas.openxmlformats.org/presentationml/2006/ole">
             <mc:AlternateContent xmlns:mc="http://schemas.openxmlformats.org/markup-compatibility/2006">
               <mc:Choice xmlns:v="urn:schemas-microsoft-com:vml" Requires="v">
-                <p:oleObj spid="_x0000_s88065" name="think-cell Slide" r:id="rId5" imgW="0" imgH="0" progId="">
+                <p:oleObj spid="_x0000_s88067" name="think-cell Slide" r:id="rId5" imgW="0" imgH="0" progId="">
                   <p:embed/>
                 </p:oleObj>
               </mc:Choice>
@@ -27955,33 +27556,8 @@
                 <a:ea typeface="+mj-ea"/>
                 <a:cs typeface="+mj-cs"/>
               </a:rPr>
-              <a:t> </a:t>
-            </a:r>
-            <a:r>
-              <a:rPr lang="en-US" sz="2000" b="1" kern="0" dirty="0" smtClean="0">
-                <a:solidFill>
-                  <a:schemeClr val="tx2">
-                    <a:lumMod val="75000"/>
-                    <a:lumOff val="25000"/>
-                  </a:schemeClr>
-                </a:solidFill>
-                <a:latin typeface="Open Sans"/>
-                <a:ea typeface="+mj-ea"/>
-                <a:cs typeface="+mj-cs"/>
-              </a:rPr>
-              <a:t>Unit Testing</a:t>
-            </a:r>
-            <a:endParaRPr lang="en-US" sz="2000" b="1" kern="0" dirty="0" smtClean="0">
-              <a:solidFill>
-                <a:schemeClr val="tx2">
-                  <a:lumMod val="75000"/>
-                  <a:lumOff val="25000"/>
-                </a:schemeClr>
-              </a:solidFill>
-              <a:latin typeface="Open Sans"/>
-              <a:ea typeface="+mj-ea"/>
-              <a:cs typeface="+mj-cs"/>
-            </a:endParaRPr>
+              <a:t> Unit Testing</a:t>
+            </a:r>
           </a:p>
           <a:p>
             <a:pPr lvl="0" defTabSz="895350" eaLnBrk="0" hangingPunct="0">
@@ -28587,7 +28163,7 @@
           <a:graphicData uri="http://schemas.openxmlformats.org/presentationml/2006/ole">
             <mc:AlternateContent xmlns:mc="http://schemas.openxmlformats.org/markup-compatibility/2006">
               <mc:Choice xmlns:v="urn:schemas-microsoft-com:vml" Requires="v">
-                <p:oleObj spid="_x0000_s26691" name="think-cell Slide" r:id="rId5" imgW="0" imgH="0" progId="">
+                <p:oleObj spid="_x0000_s26693" name="think-cell Slide" r:id="rId5" imgW="0" imgH="0" progId="">
                   <p:embed/>
                 </p:oleObj>
               </mc:Choice>
@@ -29039,7 +28615,6 @@
               <a:rPr lang="en-US" sz="1600" dirty="0" smtClean="0"/>
               <a:t>Angular 2 Router</a:t>
             </a:r>
-            <a:endParaRPr lang="en-US" sz="1600" dirty="0" smtClean="0"/>
           </a:p>
           <a:p>
             <a:pPr marL="742950" lvl="1" indent="-285750">
@@ -29114,7 +28689,6 @@
               <a:rPr lang="en-US" sz="1600" dirty="0" smtClean="0"/>
               <a:t>Unit Testing</a:t>
             </a:r>
-            <a:endParaRPr lang="en-US" sz="1600" dirty="0" smtClean="0"/>
           </a:p>
           <a:p>
             <a:pPr marL="742950" lvl="1" indent="-285750">
@@ -29264,7 +28838,7 @@
           <a:graphicData uri="http://schemas.openxmlformats.org/presentationml/2006/ole">
             <mc:AlternateContent xmlns:mc="http://schemas.openxmlformats.org/markup-compatibility/2006">
               <mc:Choice xmlns:v="urn:schemas-microsoft-com:vml" Requires="v">
-                <p:oleObj spid="_x0000_s10313" name="think-cell Slide" r:id="rId5" imgW="0" imgH="0" progId="">
+                <p:oleObj spid="_x0000_s10315" name="think-cell Slide" r:id="rId5" imgW="0" imgH="0" progId="">
                   <p:embed/>
                 </p:oleObj>
               </mc:Choice>
@@ -29356,33 +28930,8 @@
                 <a:ea typeface="+mj-ea"/>
                 <a:cs typeface="+mj-cs"/>
               </a:rPr>
-              <a:t>Angular2 – </a:t>
-            </a:r>
-            <a:r>
-              <a:rPr lang="en-US" sz="2000" b="1" kern="0" dirty="0" smtClean="0">
-                <a:solidFill>
-                  <a:schemeClr val="tx2">
-                    <a:lumMod val="75000"/>
-                    <a:lumOff val="25000"/>
-                  </a:schemeClr>
-                </a:solidFill>
-                <a:latin typeface="Open Sans"/>
-                <a:ea typeface="+mj-ea"/>
-                <a:cs typeface="+mj-cs"/>
-              </a:rPr>
-              <a:t>Routing</a:t>
-            </a:r>
-            <a:endParaRPr lang="en-US" sz="2000" b="1" kern="0" dirty="0" smtClean="0">
-              <a:solidFill>
-                <a:schemeClr val="tx2">
-                  <a:lumMod val="75000"/>
-                  <a:lumOff val="25000"/>
-                </a:schemeClr>
-              </a:solidFill>
-              <a:latin typeface="Open Sans"/>
-              <a:ea typeface="+mj-ea"/>
-              <a:cs typeface="+mj-cs"/>
-            </a:endParaRPr>
+              <a:t>Angular2 – Routing</a:t>
+            </a:r>
           </a:p>
           <a:p>
             <a:pPr lvl="0" defTabSz="895350" eaLnBrk="0" hangingPunct="0">
@@ -29778,15 +29327,6 @@
               </a:rPr>
               <a:t> a way to separate an app into area and control access to them</a:t>
             </a:r>
-            <a:endParaRPr lang="en-US" sz="1800" dirty="0" smtClean="0">
-              <a:solidFill>
-                <a:schemeClr val="tx2">
-                  <a:lumMod val="75000"/>
-                  <a:lumOff val="25000"/>
-                </a:schemeClr>
-              </a:solidFill>
-              <a:latin typeface="Open Sans"/>
-            </a:endParaRPr>
           </a:p>
         </p:txBody>
       </p:sp>
@@ -29868,7 +29408,6 @@
               <a:rPr lang="en-US" sz="1800" dirty="0" smtClean="0"/>
               <a:t>Loading of Modules on-demand</a:t>
             </a:r>
-            <a:endParaRPr lang="en-US" sz="1800" dirty="0" smtClean="0"/>
           </a:p>
         </p:txBody>
       </p:sp>
@@ -29929,7 +29468,6 @@
               <a:rPr lang="en-US" sz="1800" dirty="0" smtClean="0"/>
               <a:t>Register</a:t>
             </a:r>
-            <a:endParaRPr lang="en-US" sz="1800" dirty="0" smtClean="0"/>
           </a:p>
           <a:p>
             <a:pPr marL="1200150" lvl="2" indent="-285750">
@@ -29970,7 +29508,6 @@
               <a:rPr lang="en-US" sz="1800" dirty="0" smtClean="0"/>
               <a:t>About module</a:t>
             </a:r>
-            <a:endParaRPr lang="en-US" sz="1800" dirty="0" smtClean="0"/>
           </a:p>
         </p:txBody>
       </p:sp>
@@ -30036,7 +29573,6 @@
               <a:rPr lang="en-US" sz="1800" dirty="0" smtClean="0"/>
               <a:t>/register</a:t>
             </a:r>
-            <a:endParaRPr lang="en-US" sz="1800" dirty="0" smtClean="0"/>
           </a:p>
           <a:p>
             <a:pPr marL="1200150" lvl="2" indent="-285750">
@@ -30067,7 +29603,6 @@
               <a:rPr lang="en-US" sz="1800" dirty="0" smtClean="0"/>
               <a:t>/detail/1</a:t>
             </a:r>
-            <a:endParaRPr lang="en-US" sz="1800" dirty="0" smtClean="0"/>
           </a:p>
           <a:p>
             <a:pPr marL="1657350" lvl="3" indent="-285750">
@@ -30078,7 +29613,6 @@
               <a:rPr lang="en-US" sz="1800" dirty="0" smtClean="0"/>
               <a:t>/about</a:t>
             </a:r>
-            <a:endParaRPr lang="en-US" sz="1800" dirty="0" smtClean="0"/>
           </a:p>
         </p:txBody>
       </p:sp>
@@ -30182,7 +29716,7 @@
           <a:graphicData uri="http://schemas.openxmlformats.org/presentationml/2006/ole">
             <mc:AlternateContent xmlns:mc="http://schemas.openxmlformats.org/markup-compatibility/2006">
               <mc:Choice xmlns:v="urn:schemas-microsoft-com:vml" Requires="v">
-                <p:oleObj spid="_x0000_s37950" name="think-cell Slide" r:id="rId5" imgW="0" imgH="0" progId="">
+                <p:oleObj spid="_x0000_s37952" name="think-cell Slide" r:id="rId5" imgW="0" imgH="0" progId="">
                   <p:embed/>
                 </p:oleObj>
               </mc:Choice>
@@ -30302,33 +29836,8 @@
                 <a:ea typeface="+mj-ea"/>
                 <a:cs typeface="+mj-cs"/>
               </a:rPr>
-              <a:t> </a:t>
-            </a:r>
-            <a:r>
-              <a:rPr lang="en-US" sz="2000" b="1" kern="0" dirty="0" smtClean="0">
-                <a:solidFill>
-                  <a:schemeClr val="tx2">
-                    <a:lumMod val="75000"/>
-                    <a:lumOff val="25000"/>
-                  </a:schemeClr>
-                </a:solidFill>
-                <a:latin typeface="Open Sans"/>
-                <a:ea typeface="+mj-ea"/>
-                <a:cs typeface="+mj-cs"/>
-              </a:rPr>
-              <a:t>Routing</a:t>
-            </a:r>
-            <a:endParaRPr lang="en-US" sz="2000" b="1" kern="0" dirty="0" smtClean="0">
-              <a:solidFill>
-                <a:schemeClr val="tx2">
-                  <a:lumMod val="75000"/>
-                  <a:lumOff val="25000"/>
-                </a:schemeClr>
-              </a:solidFill>
-              <a:latin typeface="Open Sans"/>
-              <a:ea typeface="+mj-ea"/>
-              <a:cs typeface="+mj-cs"/>
-            </a:endParaRPr>
+              <a:t> Routing</a:t>
+            </a:r>
           </a:p>
           <a:p>
             <a:pPr lvl="0" defTabSz="895350" eaLnBrk="0" hangingPunct="0">
@@ -30700,15 +30209,6 @@
               </a:rPr>
               <a:t>Routing Components</a:t>
             </a:r>
-            <a:endParaRPr lang="en-US" sz="1800" dirty="0" smtClean="0">
-              <a:solidFill>
-                <a:schemeClr val="tx2">
-                  <a:lumMod val="75000"/>
-                  <a:lumOff val="25000"/>
-                </a:schemeClr>
-              </a:solidFill>
-              <a:latin typeface="Open Sans"/>
-            </a:endParaRPr>
           </a:p>
         </p:txBody>
       </p:sp>
@@ -30743,23 +30243,8 @@
                 </a:solidFill>
                 <a:latin typeface="Source Code Pro"/>
               </a:rPr>
-              <a:t>// </a:t>
-            </a:r>
-            <a:r>
-              <a:rPr lang="en-US" sz="1400" dirty="0" smtClean="0">
-                <a:solidFill>
-                  <a:srgbClr val="1AB076"/>
-                </a:solidFill>
-                <a:latin typeface="Source Code Pro"/>
-              </a:rPr>
-              <a:t>import Routing components</a:t>
-            </a:r>
-            <a:endParaRPr lang="en-US" sz="1400" dirty="0" smtClean="0">
-              <a:solidFill>
-                <a:srgbClr val="1AB076"/>
-              </a:solidFill>
-              <a:latin typeface="Source Code Pro"/>
-            </a:endParaRPr>
+              <a:t>// import Routing components</a:t>
+            </a:r>
           </a:p>
           <a:p>
             <a:r>
@@ -30786,11 +30271,6 @@
               </a:rPr>
               <a:t> } for ‘@angular/router’;</a:t>
             </a:r>
-            <a:endParaRPr lang="en-US" sz="1600" dirty="0" smtClean="0">
-              <a:solidFill>
-                <a:schemeClr val="bg1"/>
-              </a:solidFill>
-            </a:endParaRPr>
           </a:p>
         </p:txBody>
       </p:sp>
@@ -30867,14 +30347,6 @@
               </a:rPr>
               <a:t> configuration of routes</a:t>
             </a:r>
-            <a:endParaRPr lang="en-US" sz="1600" dirty="0" smtClean="0">
-              <a:solidFill>
-                <a:srgbClr val="37515F"/>
-              </a:solidFill>
-              <a:latin typeface="Open Sans" pitchFamily="34" charset="0"/>
-              <a:ea typeface="Open Sans" pitchFamily="34" charset="0"/>
-              <a:cs typeface="Open Sans" pitchFamily="34" charset="0"/>
-            </a:endParaRPr>
           </a:p>
           <a:p>
             <a:pPr marL="342900" indent="-342900">
@@ -30981,14 +30453,6 @@
               </a:rPr>
               <a:t> link to a route</a:t>
             </a:r>
-            <a:endParaRPr lang="en-US" sz="1600" dirty="0" smtClean="0">
-              <a:solidFill>
-                <a:srgbClr val="37515F"/>
-              </a:solidFill>
-              <a:latin typeface="Open Sans" pitchFamily="34" charset="0"/>
-              <a:ea typeface="Open Sans" pitchFamily="34" charset="0"/>
-              <a:cs typeface="Open Sans" pitchFamily="34" charset="0"/>
-            </a:endParaRPr>
           </a:p>
         </p:txBody>
       </p:sp>
@@ -31093,11 +30557,6 @@
               </a:rPr>
               <a:t>routes: Routes = [ </a:t>
             </a:r>
-            <a:endParaRPr lang="en-US" sz="1600" dirty="0">
-              <a:solidFill>
-                <a:schemeClr val="bg1"/>
-              </a:solidFill>
-            </a:endParaRPr>
           </a:p>
           <a:p>
             <a:r>
@@ -31274,11 +30733,6 @@
               </a:rPr>
               <a:t> }</a:t>
             </a:r>
-            <a:endParaRPr lang="en-US" sz="1600" dirty="0" smtClean="0">
-              <a:solidFill>
-                <a:schemeClr val="bg1"/>
-              </a:solidFill>
-            </a:endParaRPr>
           </a:p>
           <a:p>
             <a:r>
@@ -31289,11 +30743,6 @@
               </a:rPr>
               <a:t>];</a:t>
             </a:r>
-            <a:endParaRPr lang="en-US" sz="1600" dirty="0" smtClean="0">
-              <a:solidFill>
-                <a:schemeClr val="bg1"/>
-              </a:solidFill>
-            </a:endParaRPr>
           </a:p>
         </p:txBody>
       </p:sp>
@@ -31392,14 +30841,6 @@
               </a:rPr>
               <a:t> to this route.</a:t>
             </a:r>
-            <a:endParaRPr lang="en-US" sz="1600" dirty="0" smtClean="0">
-              <a:solidFill>
-                <a:srgbClr val="37515F"/>
-              </a:solidFill>
-              <a:latin typeface="Open Sans" pitchFamily="34" charset="0"/>
-              <a:ea typeface="Open Sans" pitchFamily="34" charset="0"/>
-              <a:cs typeface="Open Sans" pitchFamily="34" charset="0"/>
-            </a:endParaRPr>
           </a:p>
           <a:p>
             <a:pPr marL="285750" indent="-285750">
@@ -31528,14 +30969,6 @@
               </a:rPr>
               <a:t> to a different route/path</a:t>
             </a:r>
-            <a:endParaRPr lang="en-US" sz="1600" dirty="0" smtClean="0">
-              <a:solidFill>
-                <a:srgbClr val="37515F"/>
-              </a:solidFill>
-              <a:latin typeface="Open Sans" pitchFamily="34" charset="0"/>
-              <a:ea typeface="Open Sans" pitchFamily="34" charset="0"/>
-              <a:cs typeface="Open Sans" pitchFamily="34" charset="0"/>
-            </a:endParaRPr>
           </a:p>
         </p:txBody>
       </p:sp>
@@ -31596,7 +31029,7 @@
           <a:graphicData uri="http://schemas.openxmlformats.org/presentationml/2006/ole">
             <mc:AlternateContent xmlns:mc="http://schemas.openxmlformats.org/markup-compatibility/2006">
               <mc:Choice xmlns:v="urn:schemas-microsoft-com:vml" Requires="v">
-                <p:oleObj spid="_x0000_s52243" name="think-cell Slide" r:id="rId5" imgW="0" imgH="0" progId="">
+                <p:oleObj spid="_x0000_s52245" name="think-cell Slide" r:id="rId5" imgW="0" imgH="0" progId="">
                   <p:embed/>
                 </p:oleObj>
               </mc:Choice>
@@ -31716,33 +31149,8 @@
                 <a:ea typeface="+mj-ea"/>
                 <a:cs typeface="+mj-cs"/>
               </a:rPr>
-              <a:t> </a:t>
-            </a:r>
-            <a:r>
-              <a:rPr lang="en-US" sz="2000" b="1" kern="0" dirty="0" smtClean="0">
-                <a:solidFill>
-                  <a:schemeClr val="tx2">
-                    <a:lumMod val="75000"/>
-                    <a:lumOff val="25000"/>
-                  </a:schemeClr>
-                </a:solidFill>
-                <a:latin typeface="Open Sans"/>
-                <a:ea typeface="+mj-ea"/>
-                <a:cs typeface="+mj-cs"/>
-              </a:rPr>
-              <a:t>Routing</a:t>
-            </a:r>
-            <a:endParaRPr lang="en-US" sz="2000" b="1" kern="0" dirty="0" smtClean="0">
-              <a:solidFill>
-                <a:schemeClr val="tx2">
-                  <a:lumMod val="75000"/>
-                  <a:lumOff val="25000"/>
-                </a:schemeClr>
-              </a:solidFill>
-              <a:latin typeface="Open Sans"/>
-              <a:ea typeface="+mj-ea"/>
-              <a:cs typeface="+mj-cs"/>
-            </a:endParaRPr>
+              <a:t> Routing</a:t>
+            </a:r>
           </a:p>
           <a:p>
             <a:pPr lvl="0" defTabSz="895350" eaLnBrk="0" hangingPunct="0">
@@ -32114,15 +31522,6 @@
               </a:rPr>
               <a:t>Load Routes into Module</a:t>
             </a:r>
-            <a:endParaRPr lang="en-US" sz="1800" dirty="0" smtClean="0">
-              <a:solidFill>
-                <a:schemeClr val="tx2">
-                  <a:lumMod val="75000"/>
-                  <a:lumOff val="25000"/>
-                </a:schemeClr>
-              </a:solidFill>
-              <a:latin typeface="Open Sans"/>
-            </a:endParaRPr>
           </a:p>
         </p:txBody>
       </p:sp>
@@ -32249,14 +31648,6 @@
               </a:rPr>
               <a:t>(routes)</a:t>
             </a:r>
-            <a:endParaRPr lang="en-US" sz="1600" dirty="0" smtClean="0">
-              <a:solidFill>
-                <a:srgbClr val="37515F"/>
-              </a:solidFill>
-              <a:latin typeface="Open Sans" pitchFamily="34" charset="0"/>
-              <a:ea typeface="Open Sans" pitchFamily="34" charset="0"/>
-              <a:cs typeface="Open Sans" pitchFamily="34" charset="0"/>
-            </a:endParaRPr>
           </a:p>
         </p:txBody>
       </p:sp>
@@ -32517,11 +31908,6 @@
               </a:rPr>
               <a:t>   ]</a:t>
             </a:r>
-            <a:endParaRPr lang="en-US" sz="1600" dirty="0" smtClean="0">
-              <a:solidFill>
-                <a:schemeClr val="bg1"/>
-              </a:solidFill>
-            </a:endParaRPr>
           </a:p>
           <a:p>
             <a:r>
@@ -32574,15 +31960,6 @@
               </a:rPr>
               <a:t>Location Strategy</a:t>
             </a:r>
-            <a:endParaRPr lang="en-US" sz="1800" dirty="0" smtClean="0">
-              <a:solidFill>
-                <a:schemeClr val="tx2">
-                  <a:lumMod val="75000"/>
-                  <a:lumOff val="25000"/>
-                </a:schemeClr>
-              </a:solidFill>
-              <a:latin typeface="Open Sans"/>
-            </a:endParaRPr>
           </a:p>
         </p:txBody>
       </p:sp>
@@ -32766,7 +32143,7 @@
           <a:graphicData uri="http://schemas.openxmlformats.org/presentationml/2006/ole">
             <mc:AlternateContent xmlns:mc="http://schemas.openxmlformats.org/markup-compatibility/2006">
               <mc:Choice xmlns:v="urn:schemas-microsoft-com:vml" Requires="v">
-                <p:oleObj spid="_x0000_s56339" name="think-cell Slide" r:id="rId5" imgW="0" imgH="0" progId="">
+                <p:oleObj spid="_x0000_s56341" name="think-cell Slide" r:id="rId5" imgW="0" imgH="0" progId="">
                   <p:embed/>
                 </p:oleObj>
               </mc:Choice>
@@ -32886,33 +32263,8 @@
                 <a:ea typeface="+mj-ea"/>
                 <a:cs typeface="+mj-cs"/>
               </a:rPr>
-              <a:t> </a:t>
-            </a:r>
-            <a:r>
-              <a:rPr lang="en-US" sz="2000" b="1" kern="0" dirty="0" smtClean="0">
-                <a:solidFill>
-                  <a:schemeClr val="tx2">
-                    <a:lumMod val="75000"/>
-                    <a:lumOff val="25000"/>
-                  </a:schemeClr>
-                </a:solidFill>
-                <a:latin typeface="Open Sans"/>
-                <a:ea typeface="+mj-ea"/>
-                <a:cs typeface="+mj-cs"/>
-              </a:rPr>
-              <a:t>Routing</a:t>
-            </a:r>
-            <a:endParaRPr lang="en-US" sz="2000" b="1" kern="0" dirty="0" smtClean="0">
-              <a:solidFill>
-                <a:schemeClr val="tx2">
-                  <a:lumMod val="75000"/>
-                  <a:lumOff val="25000"/>
-                </a:schemeClr>
-              </a:solidFill>
-              <a:latin typeface="Open Sans"/>
-              <a:ea typeface="+mj-ea"/>
-              <a:cs typeface="+mj-cs"/>
-            </a:endParaRPr>
+              <a:t> Routing</a:t>
+            </a:r>
           </a:p>
           <a:p>
             <a:pPr lvl="0" defTabSz="895350" eaLnBrk="0" hangingPunct="0">
@@ -33344,15 +32696,6 @@
               </a:rPr>
               <a:t> when to load route component.</a:t>
             </a:r>
-            <a:endParaRPr lang="en-US" sz="1800" dirty="0" smtClean="0">
-              <a:solidFill>
-                <a:schemeClr val="tx2">
-                  <a:lumMod val="75000"/>
-                  <a:lumOff val="25000"/>
-                </a:schemeClr>
-              </a:solidFill>
-              <a:latin typeface="Open Sans"/>
-            </a:endParaRPr>
           </a:p>
         </p:txBody>
       </p:sp>
@@ -34122,11 +33465,6 @@
               </a:rPr>
               <a:t>div&gt; ` </a:t>
             </a:r>
-            <a:endParaRPr lang="en-US" sz="1400" dirty="0">
-              <a:solidFill>
-                <a:schemeClr val="bg1"/>
-              </a:solidFill>
-            </a:endParaRPr>
           </a:p>
           <a:p>
             <a:r>
@@ -34176,11 +33514,6 @@
               </a:rPr>
               <a:t>{ } </a:t>
             </a:r>
-            <a:endParaRPr lang="en-US" sz="1400" dirty="0">
-              <a:solidFill>
-                <a:schemeClr val="bg1"/>
-              </a:solidFill>
-            </a:endParaRPr>
           </a:p>
         </p:txBody>
       </p:sp>
@@ -34295,14 +33628,6 @@
               </a:rPr>
               <a:t>NO page reload</a:t>
             </a:r>
-            <a:endParaRPr lang="en-US" sz="1600" dirty="0" smtClean="0">
-              <a:solidFill>
-                <a:srgbClr val="37515F"/>
-              </a:solidFill>
-              <a:latin typeface="Open Sans" pitchFamily="34" charset="0"/>
-              <a:ea typeface="Open Sans" pitchFamily="34" charset="0"/>
-              <a:cs typeface="Open Sans" pitchFamily="34" charset="0"/>
-            </a:endParaRPr>
           </a:p>
         </p:txBody>
       </p:sp>
@@ -34665,7 +33990,7 @@
           <a:graphicData uri="http://schemas.openxmlformats.org/presentationml/2006/ole">
             <mc:AlternateContent xmlns:mc="http://schemas.openxmlformats.org/markup-compatibility/2006">
               <mc:Choice xmlns:v="urn:schemas-microsoft-com:vml" Requires="v">
-                <p:oleObj spid="_x0000_s72710" name="think-cell Slide" r:id="rId5" imgW="0" imgH="0" progId="">
+                <p:oleObj spid="_x0000_s72712" name="think-cell Slide" r:id="rId5" imgW="0" imgH="0" progId="">
                   <p:embed/>
                 </p:oleObj>
               </mc:Choice>
@@ -34785,33 +34110,8 @@
                 <a:ea typeface="+mj-ea"/>
                 <a:cs typeface="+mj-cs"/>
               </a:rPr>
-              <a:t> </a:t>
-            </a:r>
-            <a:r>
-              <a:rPr lang="en-US" sz="2000" b="1" kern="0" dirty="0" smtClean="0">
-                <a:solidFill>
-                  <a:schemeClr val="tx2">
-                    <a:lumMod val="75000"/>
-                    <a:lumOff val="25000"/>
-                  </a:schemeClr>
-                </a:solidFill>
-                <a:latin typeface="Open Sans"/>
-                <a:ea typeface="+mj-ea"/>
-                <a:cs typeface="+mj-cs"/>
-              </a:rPr>
-              <a:t>Routing</a:t>
-            </a:r>
-            <a:endParaRPr lang="en-US" sz="2000" b="1" kern="0" dirty="0" smtClean="0">
-              <a:solidFill>
-                <a:schemeClr val="tx2">
-                  <a:lumMod val="75000"/>
-                  <a:lumOff val="25000"/>
-                </a:schemeClr>
-              </a:solidFill>
-              <a:latin typeface="Open Sans"/>
-              <a:ea typeface="+mj-ea"/>
-              <a:cs typeface="+mj-cs"/>
-            </a:endParaRPr>
+              <a:t> Routing</a:t>
+            </a:r>
           </a:p>
           <a:p>
             <a:pPr lvl="0" defTabSz="895350" eaLnBrk="0" hangingPunct="0">
@@ -35183,15 +34483,6 @@
               </a:rPr>
               <a:t>Route Parameters</a:t>
             </a:r>
-            <a:endParaRPr lang="en-US" sz="1800" dirty="0" smtClean="0">
-              <a:solidFill>
-                <a:schemeClr val="tx2">
-                  <a:lumMod val="75000"/>
-                  <a:lumOff val="25000"/>
-                </a:schemeClr>
-              </a:solidFill>
-              <a:latin typeface="Open Sans"/>
-            </a:endParaRPr>
           </a:p>
         </p:txBody>
       </p:sp>
@@ -35226,23 +34517,8 @@
                 </a:solidFill>
                 <a:latin typeface="Source Code Pro"/>
               </a:rPr>
-              <a:t>// </a:t>
-            </a:r>
-            <a:r>
-              <a:rPr lang="en-US" sz="1400" dirty="0" smtClean="0">
-                <a:solidFill>
-                  <a:srgbClr val="1AB076"/>
-                </a:solidFill>
-                <a:latin typeface="Source Code Pro"/>
-              </a:rPr>
-              <a:t>route with parameters</a:t>
-            </a:r>
-            <a:endParaRPr lang="en-US" sz="1400" dirty="0" smtClean="0">
-              <a:solidFill>
-                <a:srgbClr val="1AB076"/>
-              </a:solidFill>
-              <a:latin typeface="Source Code Pro"/>
-            </a:endParaRPr>
+              <a:t>// route with parameters</a:t>
+            </a:r>
           </a:p>
           <a:p>
             <a:r>
@@ -35253,11 +34529,6 @@
               </a:rPr>
               <a:t>/detail/12345</a:t>
             </a:r>
-            <a:endParaRPr lang="en-US" sz="1600" dirty="0" smtClean="0">
-              <a:solidFill>
-                <a:schemeClr val="bg1"/>
-              </a:solidFill>
-            </a:endParaRPr>
           </a:p>
         </p:txBody>
       </p:sp>
@@ -35321,14 +34592,6 @@
               </a:rPr>
               <a:t>How do pass parameters to a Route and It’s Component?</a:t>
             </a:r>
-            <a:endParaRPr lang="en-US" sz="1600" dirty="0" smtClean="0">
-              <a:solidFill>
-                <a:srgbClr val="37515F"/>
-              </a:solidFill>
-              <a:latin typeface="Open Sans" pitchFamily="34" charset="0"/>
-              <a:ea typeface="Open Sans" pitchFamily="34" charset="0"/>
-              <a:cs typeface="Open Sans" pitchFamily="34" charset="0"/>
-            </a:endParaRPr>
           </a:p>
         </p:txBody>
       </p:sp>
@@ -35363,16 +34626,7 @@
                 </a:solidFill>
                 <a:latin typeface="Source Code Pro"/>
               </a:rPr>
-              <a:t>// </a:t>
-            </a:r>
-            <a:r>
-              <a:rPr lang="en-US" sz="1400" dirty="0" smtClean="0">
-                <a:solidFill>
-                  <a:srgbClr val="1AB076"/>
-                </a:solidFill>
-                <a:latin typeface="Source Code Pro"/>
-              </a:rPr>
-              <a:t>Configuration route with parameter</a:t>
+              <a:t>// Configuration route with parameter</a:t>
             </a:r>
             <a:endParaRPr lang="en-US" sz="1400" dirty="0">
               <a:solidFill>
@@ -35406,11 +34660,6 @@
               </a:rPr>
               <a:t>routes: Routes = [ </a:t>
             </a:r>
-            <a:endParaRPr lang="en-US" sz="1600" dirty="0">
-              <a:solidFill>
-                <a:schemeClr val="bg1"/>
-              </a:solidFill>
-            </a:endParaRPr>
           </a:p>
           <a:p>
             <a:r>
@@ -35468,11 +34717,6 @@
               </a:rPr>
               <a:t> }</a:t>
             </a:r>
-            <a:endParaRPr lang="en-US" sz="1600" dirty="0" smtClean="0">
-              <a:solidFill>
-                <a:schemeClr val="bg1"/>
-              </a:solidFill>
-            </a:endParaRPr>
           </a:p>
           <a:p>
             <a:r>
@@ -35483,11 +34727,6 @@
               </a:rPr>
               <a:t>];</a:t>
             </a:r>
-            <a:endParaRPr lang="en-US" sz="1600" dirty="0" smtClean="0">
-              <a:solidFill>
-                <a:schemeClr val="bg1"/>
-              </a:solidFill>
-            </a:endParaRPr>
           </a:p>
         </p:txBody>
       </p:sp>
@@ -35551,27 +34790,8 @@
                 <a:ea typeface="Open Sans" pitchFamily="34" charset="0"/>
                 <a:cs typeface="Open Sans" pitchFamily="34" charset="0"/>
               </a:rPr>
-              <a:t> how </a:t>
-            </a:r>
-            <a:r>
-              <a:rPr lang="en-US" sz="1600" dirty="0" smtClean="0">
-                <a:solidFill>
-                  <a:srgbClr val="37515F"/>
-                </a:solidFill>
-                <a:latin typeface="Open Sans" pitchFamily="34" charset="0"/>
-                <a:ea typeface="Open Sans" pitchFamily="34" charset="0"/>
-                <a:cs typeface="Open Sans" pitchFamily="34" charset="0"/>
-              </a:rPr>
-              <a:t>can we use it in a Component</a:t>
-            </a:r>
-            <a:endParaRPr lang="en-US" sz="1600" dirty="0" smtClean="0">
-              <a:solidFill>
-                <a:srgbClr val="37515F"/>
-              </a:solidFill>
-              <a:latin typeface="Open Sans" pitchFamily="34" charset="0"/>
-              <a:ea typeface="Open Sans" pitchFamily="34" charset="0"/>
-              <a:cs typeface="Open Sans" pitchFamily="34" charset="0"/>
-            </a:endParaRPr>
+              <a:t> how can we use it in a Component</a:t>
+            </a:r>
           </a:p>
         </p:txBody>
       </p:sp>
@@ -35632,7 +34852,7 @@
           <a:graphicData uri="http://schemas.openxmlformats.org/presentationml/2006/ole">
             <mc:AlternateContent xmlns:mc="http://schemas.openxmlformats.org/markup-compatibility/2006">
               <mc:Choice xmlns:v="urn:schemas-microsoft-com:vml" Requires="v">
-                <p:oleObj spid="_x0000_s73733" name="think-cell Slide" r:id="rId5" imgW="0" imgH="0" progId="">
+                <p:oleObj spid="_x0000_s73735" name="think-cell Slide" r:id="rId5" imgW="0" imgH="0" progId="">
                   <p:embed/>
                 </p:oleObj>
               </mc:Choice>
@@ -35752,33 +34972,8 @@
                 <a:ea typeface="+mj-ea"/>
                 <a:cs typeface="+mj-cs"/>
               </a:rPr>
-              <a:t> </a:t>
-            </a:r>
-            <a:r>
-              <a:rPr lang="en-US" sz="2000" b="1" kern="0" dirty="0" smtClean="0">
-                <a:solidFill>
-                  <a:schemeClr val="tx2">
-                    <a:lumMod val="75000"/>
-                    <a:lumOff val="25000"/>
-                  </a:schemeClr>
-                </a:solidFill>
-                <a:latin typeface="Open Sans"/>
-                <a:ea typeface="+mj-ea"/>
-                <a:cs typeface="+mj-cs"/>
-              </a:rPr>
-              <a:t>Routing</a:t>
-            </a:r>
-            <a:endParaRPr lang="en-US" sz="2000" b="1" kern="0" dirty="0" smtClean="0">
-              <a:solidFill>
-                <a:schemeClr val="tx2">
-                  <a:lumMod val="75000"/>
-                  <a:lumOff val="25000"/>
-                </a:schemeClr>
-              </a:solidFill>
-              <a:latin typeface="Open Sans"/>
-              <a:ea typeface="+mj-ea"/>
-              <a:cs typeface="+mj-cs"/>
-            </a:endParaRPr>
+              <a:t> Routing</a:t>
+            </a:r>
           </a:p>
           <a:p>
             <a:pPr lvl="0" defTabSz="895350" eaLnBrk="0" hangingPunct="0">
@@ -36184,29 +35379,8 @@
                 </a:solidFill>
                 <a:latin typeface="Open Sans"/>
               </a:rPr>
-              <a:t> using Route Parameters in a Component</a:t>
-            </a:r>
-            <a:r>
-              <a:rPr lang="en-US" sz="1800" dirty="0" smtClean="0">
-                <a:solidFill>
-                  <a:schemeClr val="tx2">
-                    <a:lumMod val="75000"/>
-                    <a:lumOff val="25000"/>
-                  </a:schemeClr>
-                </a:solidFill>
-                <a:latin typeface="Open Sans"/>
-              </a:rPr>
-              <a:t>.</a:t>
-            </a:r>
-            <a:endParaRPr lang="en-US" sz="1800" dirty="0" smtClean="0">
-              <a:solidFill>
-                <a:schemeClr val="tx2">
-                  <a:lumMod val="75000"/>
-                  <a:lumOff val="25000"/>
-                </a:schemeClr>
-              </a:solidFill>
-              <a:latin typeface="Open Sans"/>
-            </a:endParaRPr>
+              <a:t> using Route Parameters in a Component.</a:t>
+            </a:r>
           </a:p>
         </p:txBody>
       </p:sp>
@@ -36348,11 +35522,6 @@
               </a:rPr>
               <a:t> } from '@angular/router'; </a:t>
             </a:r>
-            <a:endParaRPr lang="en-US" sz="1400" dirty="0">
-              <a:solidFill>
-                <a:schemeClr val="bg1"/>
-              </a:solidFill>
-            </a:endParaRPr>
           </a:p>
           <a:p>
             <a:endParaRPr lang="en-US" sz="1400" dirty="0" smtClean="0">
@@ -36763,14 +35932,6 @@
               </a:rPr>
               <a:t>.</a:t>
             </a:r>
-            <a:endParaRPr lang="en-US" sz="1600" dirty="0" smtClean="0">
-              <a:solidFill>
-                <a:srgbClr val="37515F"/>
-              </a:solidFill>
-              <a:latin typeface="Open Sans" pitchFamily="34" charset="0"/>
-              <a:ea typeface="Open Sans" pitchFamily="34" charset="0"/>
-              <a:cs typeface="Open Sans" pitchFamily="34" charset="0"/>
-            </a:endParaRPr>
           </a:p>
         </p:txBody>
       </p:sp>
@@ -36882,7 +36043,7 @@
           <a:graphicData uri="http://schemas.openxmlformats.org/presentationml/2006/ole">
             <mc:AlternateContent xmlns:mc="http://schemas.openxmlformats.org/markup-compatibility/2006">
               <mc:Choice xmlns:v="urn:schemas-microsoft-com:vml" Requires="v">
-                <p:oleObj spid="_x0000_s74757" name="think-cell Slide" r:id="rId5" imgW="0" imgH="0" progId="">
+                <p:oleObj spid="_x0000_s74759" name="think-cell Slide" r:id="rId5" imgW="0" imgH="0" progId="">
                   <p:embed/>
                 </p:oleObj>
               </mc:Choice>
@@ -37002,33 +36163,8 @@
                 <a:ea typeface="+mj-ea"/>
                 <a:cs typeface="+mj-cs"/>
               </a:rPr>
-              <a:t> </a:t>
-            </a:r>
-            <a:r>
-              <a:rPr lang="en-US" sz="2000" b="1" kern="0" dirty="0" smtClean="0">
-                <a:solidFill>
-                  <a:schemeClr val="tx2">
-                    <a:lumMod val="75000"/>
-                    <a:lumOff val="25000"/>
-                  </a:schemeClr>
-                </a:solidFill>
-                <a:latin typeface="Open Sans"/>
-                <a:ea typeface="+mj-ea"/>
-                <a:cs typeface="+mj-cs"/>
-              </a:rPr>
-              <a:t>Routing</a:t>
-            </a:r>
-            <a:endParaRPr lang="en-US" sz="2000" b="1" kern="0" dirty="0" smtClean="0">
-              <a:solidFill>
-                <a:schemeClr val="tx2">
-                  <a:lumMod val="75000"/>
-                  <a:lumOff val="25000"/>
-                </a:schemeClr>
-              </a:solidFill>
-              <a:latin typeface="Open Sans"/>
-              <a:ea typeface="+mj-ea"/>
-              <a:cs typeface="+mj-cs"/>
-            </a:endParaRPr>
+              <a:t> Routing</a:t>
+            </a:r>
           </a:p>
           <a:p>
             <a:pPr lvl="0" defTabSz="895350" eaLnBrk="0" hangingPunct="0">
@@ -37422,29 +36558,8 @@
                 </a:solidFill>
                 <a:latin typeface="Open Sans"/>
               </a:rPr>
-              <a:t> responding to routing events</a:t>
-            </a:r>
-            <a:r>
-              <a:rPr lang="en-US" sz="1800" dirty="0" smtClean="0">
-                <a:solidFill>
-                  <a:schemeClr val="tx2">
-                    <a:lumMod val="75000"/>
-                    <a:lumOff val="25000"/>
-                  </a:schemeClr>
-                </a:solidFill>
-                <a:latin typeface="Open Sans"/>
-              </a:rPr>
-              <a:t>.</a:t>
-            </a:r>
-            <a:endParaRPr lang="en-US" sz="1800" dirty="0" smtClean="0">
-              <a:solidFill>
-                <a:schemeClr val="tx2">
-                  <a:lumMod val="75000"/>
-                  <a:lumOff val="25000"/>
-                </a:schemeClr>
-              </a:solidFill>
-              <a:latin typeface="Open Sans"/>
-            </a:endParaRPr>
+              <a:t> responding to routing events.</a:t>
+            </a:r>
           </a:p>
         </p:txBody>
       </p:sp>
@@ -37635,15 +36750,6 @@
               </a:rPr>
               <a:t>Router Hooks</a:t>
             </a:r>
-            <a:endParaRPr lang="en-US" sz="1800" dirty="0" smtClean="0">
-              <a:solidFill>
-                <a:schemeClr val="tx2">
-                  <a:lumMod val="75000"/>
-                  <a:lumOff val="25000"/>
-                </a:schemeClr>
-              </a:solidFill>
-              <a:latin typeface="Open Sans"/>
-            </a:endParaRPr>
           </a:p>
         </p:txBody>
       </p:sp>
@@ -37748,15 +36854,6 @@
               </a:rPr>
               <a:t>Guard Class</a:t>
             </a:r>
-            <a:endParaRPr lang="en-US" sz="1800" dirty="0" smtClean="0">
-              <a:solidFill>
-                <a:schemeClr val="tx2">
-                  <a:lumMod val="75000"/>
-                  <a:lumOff val="25000"/>
-                </a:schemeClr>
-              </a:solidFill>
-              <a:latin typeface="Open Sans"/>
-            </a:endParaRPr>
           </a:p>
         </p:txBody>
       </p:sp>
@@ -37867,16 +36964,7 @@
                 </a:solidFill>
                 <a:latin typeface="Source Code Pro"/>
               </a:rPr>
-              <a:t>// </a:t>
-            </a:r>
-            <a:r>
-              <a:rPr lang="en-US" sz="1400" dirty="0" smtClean="0">
-                <a:solidFill>
-                  <a:srgbClr val="1AB076"/>
-                </a:solidFill>
-                <a:latin typeface="Source Code Pro"/>
-              </a:rPr>
-              <a:t>Guard Class</a:t>
+              <a:t>// Guard Class</a:t>
             </a:r>
             <a:endParaRPr lang="en-US" sz="1400" dirty="0">
               <a:solidFill>
@@ -37949,11 +37037,6 @@
               </a:rPr>
               <a:t> { </a:t>
             </a:r>
-            <a:endParaRPr lang="en-US" sz="1600" dirty="0">
-              <a:solidFill>
-                <a:schemeClr val="bg1"/>
-              </a:solidFill>
-            </a:endParaRPr>
           </a:p>
           <a:p>
             <a:r>
@@ -38004,11 +37087,6 @@
               </a:rPr>
               <a:t>) {} </a:t>
             </a:r>
-            <a:endParaRPr lang="en-US" sz="1600" dirty="0">
-              <a:solidFill>
-                <a:schemeClr val="bg1"/>
-              </a:solidFill>
-            </a:endParaRPr>
           </a:p>
           <a:p>
             <a:r>
@@ -38106,11 +37184,6 @@
               </a:rPr>
               <a:t>(); </a:t>
             </a:r>
-            <a:endParaRPr lang="en-US" sz="1600" dirty="0">
-              <a:solidFill>
-                <a:schemeClr val="bg1"/>
-              </a:solidFill>
-            </a:endParaRPr>
           </a:p>
           <a:p>
             <a:r>

</xml_diff>